<commit_message>
added user guide link
</commit_message>
<xml_diff>
--- a/The Exam System - Documentation.pptx
+++ b/The Exam System - Documentation.pptx
@@ -5,10 +5,10 @@
     <p:sldMasterId id="2147483660" r:id="rId1"/>
   </p:sldMasterIdLst>
   <p:notesMasterIdLst>
-    <p:notesMasterId r:id="rId16"/>
+    <p:notesMasterId r:id="rId17"/>
   </p:notesMasterIdLst>
   <p:handoutMasterIdLst>
-    <p:handoutMasterId r:id="rId17"/>
+    <p:handoutMasterId r:id="rId18"/>
   </p:handoutMasterIdLst>
   <p:sldIdLst>
     <p:sldId id="327" r:id="rId2"/>
@@ -17,14 +17,15 @@
     <p:sldId id="352" r:id="rId5"/>
     <p:sldId id="345" r:id="rId6"/>
     <p:sldId id="346" r:id="rId7"/>
-    <p:sldId id="348" r:id="rId8"/>
-    <p:sldId id="349" r:id="rId9"/>
-    <p:sldId id="364" r:id="rId10"/>
-    <p:sldId id="350" r:id="rId11"/>
-    <p:sldId id="351" r:id="rId12"/>
-    <p:sldId id="310" r:id="rId13"/>
-    <p:sldId id="265" r:id="rId14"/>
-    <p:sldId id="339" r:id="rId15"/>
+    <p:sldId id="365" r:id="rId8"/>
+    <p:sldId id="348" r:id="rId9"/>
+    <p:sldId id="349" r:id="rId10"/>
+    <p:sldId id="364" r:id="rId11"/>
+    <p:sldId id="350" r:id="rId12"/>
+    <p:sldId id="351" r:id="rId13"/>
+    <p:sldId id="310" r:id="rId14"/>
+    <p:sldId id="265" r:id="rId15"/>
+    <p:sldId id="339" r:id="rId16"/>
   </p:sldIdLst>
   <p:sldSz cx="9144000" cy="6858000" type="screen4x3"/>
   <p:notesSz cx="6858000" cy="9144000"/>
@@ -606,7 +607,7 @@
           </a:bodyPr>
           <a:lstStyle/>
           <a:p>
-            <a:endParaRPr lang="en-US" dirty="0"/>
+            <a:endParaRPr lang="en-US"/>
           </a:p>
         </p:txBody>
       </p:sp>
@@ -688,7 +689,7 @@
           </a:bodyPr>
           <a:lstStyle/>
           <a:p>
-            <a:endParaRPr lang="en-US"/>
+            <a:endParaRPr lang="en-US" dirty="0"/>
           </a:p>
         </p:txBody>
       </p:sp>
@@ -743,6 +744,39 @@
       </p:grpSpPr>
       <p:sp>
         <p:nvSpPr>
+          <p:cNvPr id="2" name="Slide Image Placeholder 1"/>
+          <p:cNvSpPr>
+            <a:spLocks noGrp="1" noRot="1" noChangeAspect="1"/>
+          </p:cNvSpPr>
+          <p:nvPr>
+            <p:ph type="sldImg"/>
+          </p:nvPr>
+        </p:nvSpPr>
+        <p:spPr/>
+      </p:sp>
+      <p:sp>
+        <p:nvSpPr>
+          <p:cNvPr id="3" name="Notes Placeholder 2"/>
+          <p:cNvSpPr>
+            <a:spLocks noGrp="1"/>
+          </p:cNvSpPr>
+          <p:nvPr>
+            <p:ph type="body" idx="1"/>
+          </p:nvPr>
+        </p:nvSpPr>
+        <p:spPr/>
+        <p:txBody>
+          <a:bodyPr>
+            <a:normAutofit/>
+          </a:bodyPr>
+          <a:lstStyle/>
+          <a:p>
+            <a:endParaRPr lang="en-US"/>
+          </a:p>
+        </p:txBody>
+      </p:sp>
+      <p:sp>
+        <p:nvSpPr>
           <p:cNvPr id="4" name="Slide Number Placeholder 3"/>
           <p:cNvSpPr>
             <a:spLocks noGrp="1"/>
@@ -761,39 +795,6 @@
               <a:pPr/>
               <a:t>13</a:t>
             </a:fld>
-            <a:endParaRPr lang="de-DE" dirty="0"/>
-          </a:p>
-        </p:txBody>
-      </p:sp>
-      <p:sp>
-        <p:nvSpPr>
-          <p:cNvPr id="15" name="Slide Image Placeholder 14"/>
-          <p:cNvSpPr>
-            <a:spLocks noGrp="1" noRot="1" noChangeAspect="1"/>
-          </p:cNvSpPr>
-          <p:nvPr>
-            <p:ph type="sldImg"/>
-          </p:nvPr>
-        </p:nvSpPr>
-        <p:spPr/>
-      </p:sp>
-      <p:sp>
-        <p:nvSpPr>
-          <p:cNvPr id="16" name="Notes Placeholder 15"/>
-          <p:cNvSpPr>
-            <a:spLocks noGrp="1"/>
-          </p:cNvSpPr>
-          <p:nvPr>
-            <p:ph type="body" idx="1"/>
-          </p:nvPr>
-        </p:nvSpPr>
-        <p:spPr/>
-        <p:txBody>
-          <a:bodyPr>
-            <a:normAutofit/>
-          </a:bodyPr>
-          <a:lstStyle/>
-          <a:p>
             <a:endParaRPr lang="de-DE" dirty="0"/>
           </a:p>
         </p:txBody>
@@ -825,7 +826,31 @@
       </p:grpSpPr>
       <p:sp>
         <p:nvSpPr>
-          <p:cNvPr id="2" name="Slide Image Placeholder 1"/>
+          <p:cNvPr id="4" name="Slide Number Placeholder 3"/>
+          <p:cNvSpPr>
+            <a:spLocks noGrp="1"/>
+          </p:cNvSpPr>
+          <p:nvPr>
+            <p:ph type="sldNum" sz="quarter" idx="10"/>
+          </p:nvPr>
+        </p:nvSpPr>
+        <p:spPr/>
+        <p:txBody>
+          <a:bodyPr/>
+          <a:lstStyle/>
+          <a:p>
+            <a:fld id="{7D8C2C35-2B8A-446E-BEC0-FD36716C29AC}" type="slidenum">
+              <a:rPr lang="de-DE" smtClean="0"/>
+              <a:pPr/>
+              <a:t>14</a:t>
+            </a:fld>
+            <a:endParaRPr lang="de-DE" dirty="0"/>
+          </a:p>
+        </p:txBody>
+      </p:sp>
+      <p:sp>
+        <p:nvSpPr>
+          <p:cNvPr id="15" name="Slide Image Placeholder 14"/>
           <p:cNvSpPr>
             <a:spLocks noGrp="1" noRot="1" noChangeAspect="1"/>
           </p:cNvSpPr>
@@ -837,7 +862,7 @@
       </p:sp>
       <p:sp>
         <p:nvSpPr>
-          <p:cNvPr id="3" name="Notes Placeholder 2"/>
+          <p:cNvPr id="16" name="Notes Placeholder 15"/>
           <p:cNvSpPr>
             <a:spLocks noGrp="1"/>
           </p:cNvSpPr>
@@ -852,6 +877,64 @@
           </a:bodyPr>
           <a:lstStyle/>
           <a:p>
+            <a:endParaRPr lang="de-DE" dirty="0"/>
+          </a:p>
+        </p:txBody>
+      </p:sp>
+    </p:spTree>
+  </p:cSld>
+  <p:clrMapOvr>
+    <a:masterClrMapping/>
+  </p:clrMapOvr>
+</p:notes>
+</file>
+
+<file path=ppt/notesSlides/notesSlide14.xml><?xml version="1.0" encoding="utf-8"?>
+<p:notes xmlns:a="http://schemas.openxmlformats.org/drawingml/2006/main" xmlns:r="http://schemas.openxmlformats.org/officeDocument/2006/relationships" xmlns:p="http://schemas.openxmlformats.org/presentationml/2006/main">
+  <p:cSld>
+    <p:spTree>
+      <p:nvGrpSpPr>
+        <p:cNvPr id="1" name=""/>
+        <p:cNvGrpSpPr/>
+        <p:nvPr/>
+      </p:nvGrpSpPr>
+      <p:grpSpPr>
+        <a:xfrm>
+          <a:off x="0" y="0"/>
+          <a:ext cx="0" cy="0"/>
+          <a:chOff x="0" y="0"/>
+          <a:chExt cx="0" cy="0"/>
+        </a:xfrm>
+      </p:grpSpPr>
+      <p:sp>
+        <p:nvSpPr>
+          <p:cNvPr id="2" name="Slide Image Placeholder 1"/>
+          <p:cNvSpPr>
+            <a:spLocks noGrp="1" noRot="1" noChangeAspect="1"/>
+          </p:cNvSpPr>
+          <p:nvPr>
+            <p:ph type="sldImg"/>
+          </p:nvPr>
+        </p:nvSpPr>
+        <p:spPr/>
+      </p:sp>
+      <p:sp>
+        <p:nvSpPr>
+          <p:cNvPr id="3" name="Notes Placeholder 2"/>
+          <p:cNvSpPr>
+            <a:spLocks noGrp="1"/>
+          </p:cNvSpPr>
+          <p:nvPr>
+            <p:ph type="body" idx="1"/>
+          </p:nvPr>
+        </p:nvSpPr>
+        <p:spPr/>
+        <p:txBody>
+          <a:bodyPr>
+            <a:normAutofit/>
+          </a:bodyPr>
+          <a:lstStyle/>
+          <a:p>
             <a:endParaRPr lang="en-US"/>
           </a:p>
         </p:txBody>
@@ -874,7 +957,7 @@
             <a:fld id="{7D8C2C35-2B8A-446E-BEC0-FD36716C29AC}" type="slidenum">
               <a:rPr lang="de-DE" smtClean="0"/>
               <a:pPr/>
-              <a:t>14</a:t>
+              <a:t>15</a:t>
             </a:fld>
             <a:endParaRPr lang="de-DE" dirty="0"/>
           </a:p>
@@ -1262,7 +1345,7 @@
           </a:bodyPr>
           <a:lstStyle/>
           <a:p>
-            <a:endParaRPr lang="en-US"/>
+            <a:endParaRPr lang="en-US" dirty="0"/>
           </a:p>
         </p:txBody>
       </p:sp>
@@ -1344,7 +1427,7 @@
           </a:bodyPr>
           <a:lstStyle/>
           <a:p>
-            <a:endParaRPr lang="en-US" dirty="0"/>
+            <a:endParaRPr lang="en-US"/>
           </a:p>
         </p:txBody>
       </p:sp>
@@ -1508,7 +1591,7 @@
           </a:bodyPr>
           <a:lstStyle/>
           <a:p>
-            <a:endParaRPr lang="en-US"/>
+            <a:endParaRPr lang="en-US" dirty="0"/>
           </a:p>
         </p:txBody>
       </p:sp>
@@ -7143,7 +7226,7 @@
             <a:spLocks noGrp="1"/>
           </p:cNvSpPr>
           <p:nvPr>
-            <p:ph type="ctrTitle"/>
+            <p:ph type="title"/>
           </p:nvPr>
         </p:nvSpPr>
         <p:spPr/>
@@ -7152,10 +7235,10 @@
           <a:lstStyle/>
           <a:p>
             <a:r>
-              <a:rPr lang="en-US" dirty="0"/>
-              <a:t>Frameworks and Tools Used</a:t>
-            </a:r>
-            <a:endParaRPr lang="en-US" dirty="0"/>
+              <a:rPr lang="en-US" dirty="0" smtClean="0"/>
+              <a:t>Why It’s Designed Like This</a:t>
+            </a:r>
+            <a:endParaRPr lang="en-US" sz="2000" b="0" dirty="0"/>
           </a:p>
         </p:txBody>
       </p:sp>
@@ -7174,6 +7257,85 @@
           <a:bodyPr/>
           <a:lstStyle/>
           <a:p>
+            <a:pPr lvl="0"/>
+            <a:r>
+              <a:rPr lang="en-US" dirty="0" smtClean="0"/>
+              <a:t>The database was designed like this to solve several use cases:</a:t>
+            </a:r>
+          </a:p>
+          <a:p>
+            <a:pPr marL="555625" lvl="2" indent="-285750">
+              <a:buFont typeface="Arial" pitchFamily="34" charset="0"/>
+              <a:buChar char="•"/>
+            </a:pPr>
+            <a:r>
+              <a:rPr lang="en-US" dirty="0" smtClean="0"/>
+              <a:t>An exam should be able to have multiple sections</a:t>
+            </a:r>
+          </a:p>
+          <a:p>
+            <a:pPr marL="555625" lvl="2" indent="-285750">
+              <a:buFont typeface="Arial" pitchFamily="34" charset="0"/>
+              <a:buChar char="•"/>
+            </a:pPr>
+            <a:r>
+              <a:rPr lang="en-US" dirty="0" smtClean="0"/>
+              <a:t>Each section should be able to have multiple questions</a:t>
+            </a:r>
+          </a:p>
+          <a:p>
+            <a:pPr marL="555625" lvl="2" indent="-285750">
+              <a:buFont typeface="Arial" pitchFamily="34" charset="0"/>
+              <a:buChar char="•"/>
+            </a:pPr>
+            <a:r>
+              <a:rPr lang="en-US" dirty="0" smtClean="0"/>
+              <a:t>Each question should be able to have several possible answers but only 1 correct one</a:t>
+            </a:r>
+          </a:p>
+          <a:p>
+            <a:pPr marL="555625" lvl="2" indent="-285750">
+              <a:buFont typeface="Arial" pitchFamily="34" charset="0"/>
+              <a:buChar char="•"/>
+            </a:pPr>
+            <a:r>
+              <a:rPr lang="en-US" dirty="0" smtClean="0"/>
+              <a:t>A question associated with any given section should not be required to have the same answer as itself in another section:</a:t>
+            </a:r>
+          </a:p>
+          <a:p>
+            <a:pPr marL="735750" lvl="3" indent="-285750">
+              <a:buFont typeface="Arial" pitchFamily="34" charset="0"/>
+              <a:buChar char="•"/>
+            </a:pPr>
+            <a:r>
+              <a:rPr lang="en-US" dirty="0" smtClean="0"/>
+              <a:t>ex:</a:t>
+            </a:r>
+          </a:p>
+          <a:p>
+            <a:pPr marL="915750" lvl="4" indent="-285750">
+              <a:buFont typeface="Arial" pitchFamily="34" charset="0"/>
+              <a:buChar char="•"/>
+            </a:pPr>
+            <a:r>
+              <a:rPr lang="en-US" dirty="0" smtClean="0"/>
+              <a:t>Question: What color do you get if you mix every color together?</a:t>
+            </a:r>
+          </a:p>
+          <a:p>
+            <a:pPr marL="915750" lvl="4" indent="-285750"/>
+            <a:r>
+              <a:rPr lang="en-US" dirty="0" smtClean="0"/>
+              <a:t>If this question was being asked in an “Art” section, the answer would be “Black”</a:t>
+            </a:r>
+          </a:p>
+          <a:p>
+            <a:pPr marL="915750" lvl="4" indent="-285750"/>
+            <a:r>
+              <a:rPr lang="en-US" dirty="0" smtClean="0"/>
+              <a:t>If this question was being asked in a “Physics” section, the answer would be “White”</a:t>
+            </a:r>
             <a:endParaRPr lang="en-US" dirty="0"/>
           </a:p>
         </p:txBody>
@@ -7181,13 +7343,14 @@
     </p:spTree>
     <p:extLst>
       <p:ext uri="{BB962C8B-B14F-4D97-AF65-F5344CB8AC3E}">
-        <p14:creationId xmlns:p14="http://schemas.microsoft.com/office/powerpoint/2010/main" val="532884204"/>
+        <p14:creationId xmlns:p14="http://schemas.microsoft.com/office/powerpoint/2010/main" val="1492411916"/>
       </p:ext>
     </p:extLst>
   </p:cSld>
   <p:clrMapOvr>
     <a:masterClrMapping/>
   </p:clrMapOvr>
+  <p:transition spd="med"/>
   <p:timing>
     <p:tnLst>
       <p:par>
@@ -7222,7 +7385,7 @@
             <a:spLocks noGrp="1"/>
           </p:cNvSpPr>
           <p:nvPr>
-            <p:ph type="title"/>
+            <p:ph type="ctrTitle"/>
           </p:nvPr>
         </p:nvSpPr>
         <p:spPr/>
@@ -7231,10 +7394,9 @@
           <a:lstStyle/>
           <a:p>
             <a:r>
-              <a:rPr lang="en-US" sz="2000" dirty="0" smtClean="0"/>
-              <a:t>Frameworks/Libraries</a:t>
-            </a:r>
-            <a:endParaRPr lang="en-US" sz="2000" dirty="0"/>
+              <a:rPr lang="en-US" dirty="0"/>
+              <a:t>Frameworks and Tools Used</a:t>
+            </a:r>
           </a:p>
         </p:txBody>
       </p:sp>
@@ -7253,46 +7415,20 @@
           <a:bodyPr/>
           <a:lstStyle/>
           <a:p>
-            <a:pPr lvl="0"/>
-            <a:r>
-              <a:rPr lang="en-US" dirty="0" smtClean="0"/>
-              <a:t>The only library used was </a:t>
-            </a:r>
-            <a:r>
-              <a:rPr lang="en-US" dirty="0" err="1" smtClean="0"/>
-              <a:t>jQuery</a:t>
-            </a:r>
-            <a:endParaRPr lang="en-US" dirty="0" smtClean="0"/>
-          </a:p>
-          <a:p>
-            <a:pPr lvl="1"/>
-            <a:r>
-              <a:rPr lang="en-US" dirty="0" smtClean="0"/>
-              <a:t>All other functionality and usability is </a:t>
-            </a:r>
-            <a:r>
-              <a:rPr lang="en-US" dirty="0" err="1" smtClean="0"/>
-              <a:t>handcoded</a:t>
-            </a:r>
-            <a:r>
-              <a:rPr lang="en-US" dirty="0" smtClean="0"/>
-              <a:t>.</a:t>
-            </a:r>
-            <a:endParaRPr lang="en-US" dirty="0" smtClean="0"/>
+            <a:endParaRPr lang="en-US" dirty="0"/>
           </a:p>
         </p:txBody>
       </p:sp>
     </p:spTree>
     <p:extLst>
       <p:ext uri="{BB962C8B-B14F-4D97-AF65-F5344CB8AC3E}">
-        <p14:creationId xmlns:p14="http://schemas.microsoft.com/office/powerpoint/2010/main" val="2949427589"/>
+        <p14:creationId xmlns:p14="http://schemas.microsoft.com/office/powerpoint/2010/main" val="532884204"/>
       </p:ext>
     </p:extLst>
   </p:cSld>
   <p:clrMapOvr>
     <a:masterClrMapping/>
   </p:clrMapOvr>
-  <p:transition spd="med"/>
   <p:timing>
     <p:tnLst>
       <p:par>
@@ -7322,6 +7458,110 @@
       </p:grpSpPr>
       <p:sp>
         <p:nvSpPr>
+          <p:cNvPr id="2" name="Title 1"/>
+          <p:cNvSpPr>
+            <a:spLocks noGrp="1"/>
+          </p:cNvSpPr>
+          <p:nvPr>
+            <p:ph type="title"/>
+          </p:nvPr>
+        </p:nvSpPr>
+        <p:spPr/>
+        <p:txBody>
+          <a:bodyPr/>
+          <a:lstStyle/>
+          <a:p>
+            <a:r>
+              <a:rPr lang="en-US" sz="2000" dirty="0" smtClean="0"/>
+              <a:t>Frameworks/Libraries</a:t>
+            </a:r>
+            <a:endParaRPr lang="en-US" sz="2000" dirty="0"/>
+          </a:p>
+        </p:txBody>
+      </p:sp>
+      <p:sp>
+        <p:nvSpPr>
+          <p:cNvPr id="3" name="Text Placeholder 2"/>
+          <p:cNvSpPr>
+            <a:spLocks noGrp="1"/>
+          </p:cNvSpPr>
+          <p:nvPr>
+            <p:ph type="body" sz="quarter" idx="10"/>
+          </p:nvPr>
+        </p:nvSpPr>
+        <p:spPr/>
+        <p:txBody>
+          <a:bodyPr/>
+          <a:lstStyle/>
+          <a:p>
+            <a:pPr lvl="0"/>
+            <a:r>
+              <a:rPr lang="en-US" dirty="0" smtClean="0"/>
+              <a:t>The only library used was </a:t>
+            </a:r>
+            <a:r>
+              <a:rPr lang="en-US" dirty="0" err="1" smtClean="0"/>
+              <a:t>jQuery</a:t>
+            </a:r>
+            <a:endParaRPr lang="en-US" dirty="0" smtClean="0"/>
+          </a:p>
+          <a:p>
+            <a:pPr lvl="1"/>
+            <a:r>
+              <a:rPr lang="en-US" dirty="0" smtClean="0"/>
+              <a:t>All other functionality and usability is </a:t>
+            </a:r>
+            <a:r>
+              <a:rPr lang="en-US" dirty="0" err="1" smtClean="0"/>
+              <a:t>handcoded</a:t>
+            </a:r>
+            <a:r>
+              <a:rPr lang="en-US" dirty="0" smtClean="0"/>
+              <a:t>.</a:t>
+            </a:r>
+          </a:p>
+        </p:txBody>
+      </p:sp>
+    </p:spTree>
+    <p:extLst>
+      <p:ext uri="{BB962C8B-B14F-4D97-AF65-F5344CB8AC3E}">
+        <p14:creationId xmlns:p14="http://schemas.microsoft.com/office/powerpoint/2010/main" val="2949427589"/>
+      </p:ext>
+    </p:extLst>
+  </p:cSld>
+  <p:clrMapOvr>
+    <a:masterClrMapping/>
+  </p:clrMapOvr>
+  <p:transition spd="med"/>
+  <p:timing>
+    <p:tnLst>
+      <p:par>
+        <p:cTn id="1" dur="indefinite" restart="never" nodeType="tmRoot"/>
+      </p:par>
+    </p:tnLst>
+  </p:timing>
+</p:sld>
+</file>
+
+<file path=ppt/slides/slide13.xml><?xml version="1.0" encoding="utf-8"?>
+<p:sld xmlns:a="http://schemas.openxmlformats.org/drawingml/2006/main" xmlns:r="http://schemas.openxmlformats.org/officeDocument/2006/relationships" xmlns:p="http://schemas.openxmlformats.org/presentationml/2006/main">
+  <p:cSld>
+    <p:spTree>
+      <p:nvGrpSpPr>
+        <p:cNvPr id="1" name=""/>
+        <p:cNvGrpSpPr/>
+        <p:nvPr/>
+      </p:nvGrpSpPr>
+      <p:grpSpPr>
+        <a:xfrm>
+          <a:off x="0" y="0"/>
+          <a:ext cx="0" cy="0"/>
+          <a:chOff x="0" y="0"/>
+          <a:chExt cx="0" cy="0"/>
+        </a:xfrm>
+      </p:grpSpPr>
+      <p:sp>
+        <p:nvSpPr>
           <p:cNvPr id="5" name="Title 4"/>
           <p:cNvSpPr>
             <a:spLocks noGrp="1"/>
@@ -7400,7 +7640,7 @@
 </p:sld>
 </file>
 
-<file path=ppt/slides/slide13.xml><?xml version="1.0" encoding="utf-8"?>
+<file path=ppt/slides/slide14.xml><?xml version="1.0" encoding="utf-8"?>
 <p:sld xmlns:a="http://schemas.openxmlformats.org/drawingml/2006/main" xmlns:r="http://schemas.openxmlformats.org/officeDocument/2006/relationships" xmlns:p="http://schemas.openxmlformats.org/presentationml/2006/main" show="0">
   <p:cSld>
     <p:spTree>
@@ -7433,7 +7673,7 @@
 </p:sld>
 </file>
 
-<file path=ppt/slides/slide14.xml><?xml version="1.0" encoding="utf-8"?>
+<file path=ppt/slides/slide15.xml><?xml version="1.0" encoding="utf-8"?>
 <p:sld xmlns:a="http://schemas.openxmlformats.org/drawingml/2006/main" xmlns:r="http://schemas.openxmlformats.org/officeDocument/2006/relationships" xmlns:p="http://schemas.openxmlformats.org/presentationml/2006/main" show="0">
   <p:cSld>
     <p:spTree>
@@ -7726,13 +7966,8 @@
             <a:pPr lvl="0"/>
             <a:r>
               <a:rPr lang="en-US" dirty="0" smtClean="0"/>
-              <a:t>A </a:t>
-            </a:r>
-            <a:r>
-              <a:rPr lang="en-US" dirty="0" smtClean="0"/>
-              <a:t>web application to create and administer quizzes/tests/exams</a:t>
-            </a:r>
-            <a:endParaRPr lang="en-US" dirty="0" smtClean="0"/>
+              <a:t>A web application to create and administer quizzes/tests/exams</a:t>
+            </a:r>
           </a:p>
           <a:p>
             <a:pPr lvl="1"/>
@@ -7740,7 +7975,6 @@
               <a:rPr lang="en-US" dirty="0" smtClean="0"/>
               <a:t>Users will be able to:</a:t>
             </a:r>
-            <a:endParaRPr lang="en-US" dirty="0" smtClean="0"/>
           </a:p>
           <a:p>
             <a:pPr lvl="2"/>
@@ -7797,7 +8031,6 @@
               <a:rPr lang="en-US" dirty="0" smtClean="0"/>
               <a:t>Keep track of the previous exams taken using the user control panel</a:t>
             </a:r>
-            <a:endParaRPr lang="en-US" dirty="0" smtClean="0"/>
           </a:p>
           <a:p>
             <a:pPr lvl="2"/>
@@ -7862,7 +8095,6 @@
               <a:rPr lang="en-US" dirty="0"/>
               <a:t>Classes</a:t>
             </a:r>
-            <a:endParaRPr lang="en-US" dirty="0"/>
           </a:p>
         </p:txBody>
       </p:sp>
@@ -7969,7 +8201,6 @@
               <a:rPr lang="en-US" dirty="0" smtClean="0"/>
               <a:t>Every table in the database has its own class</a:t>
             </a:r>
-            <a:endParaRPr lang="en-US" dirty="0" smtClean="0"/>
           </a:p>
           <a:p>
             <a:pPr lvl="1"/>
@@ -7977,7 +8208,6 @@
               <a:rPr lang="en-US" dirty="0" smtClean="0"/>
               <a:t>Along with basic getter/setters for every variable which a table row would have, each class has the ability to:</a:t>
             </a:r>
-            <a:endParaRPr lang="en-US" dirty="0" smtClean="0"/>
           </a:p>
           <a:p>
             <a:pPr lvl="2"/>
@@ -8054,6 +8284,337 @@
       </p:grpSpPr>
       <p:sp>
         <p:nvSpPr>
+          <p:cNvPr id="16" name="Title 1"/>
+          <p:cNvSpPr>
+            <a:spLocks noGrp="1"/>
+          </p:cNvSpPr>
+          <p:nvPr>
+            <p:ph type="title"/>
+          </p:nvPr>
+        </p:nvSpPr>
+        <p:spPr>
+          <a:xfrm>
+            <a:off x="324000" y="324000"/>
+            <a:ext cx="8496000" cy="756000"/>
+          </a:xfrm>
+        </p:spPr>
+        <p:txBody>
+          <a:bodyPr/>
+          <a:lstStyle/>
+          <a:p>
+            <a:r>
+              <a:rPr lang="en-US" sz="2000" b="0" dirty="0" smtClean="0"/>
+              <a:t>Exam Objects</a:t>
+            </a:r>
+            <a:endParaRPr lang="en-US" sz="2000" b="0" dirty="0"/>
+          </a:p>
+        </p:txBody>
+      </p:sp>
+      <p:sp>
+        <p:nvSpPr>
+          <p:cNvPr id="17" name="Text Placeholder 2"/>
+          <p:cNvSpPr>
+            <a:spLocks noGrp="1"/>
+          </p:cNvSpPr>
+          <p:nvPr>
+            <p:ph type="body" sz="quarter" idx="10"/>
+          </p:nvPr>
+        </p:nvSpPr>
+        <p:spPr>
+          <a:xfrm>
+            <a:off x="324000" y="1690687"/>
+            <a:ext cx="8461077" cy="958509"/>
+          </a:xfrm>
+        </p:spPr>
+        <p:txBody>
+          <a:bodyPr/>
+          <a:lstStyle/>
+          <a:p>
+            <a:pPr lvl="0"/>
+            <a:r>
+              <a:rPr lang="en-US" dirty="0" smtClean="0"/>
+              <a:t>It is necessary to understand how the systems objects (exams, sections, etc..) are related to one another in order to create proper exams.</a:t>
+            </a:r>
+          </a:p>
+        </p:txBody>
+      </p:sp>
+      <p:sp>
+        <p:nvSpPr>
+          <p:cNvPr id="18" name="TextBox 17"/>
+          <p:cNvSpPr txBox="1"/>
+          <p:nvPr/>
+        </p:nvSpPr>
+        <p:spPr>
+          <a:xfrm>
+            <a:off x="3717421" y="2418460"/>
+            <a:ext cx="4802736" cy="2908489"/>
+          </a:xfrm>
+          <a:prstGeom prst="rect">
+            <a:avLst/>
+          </a:prstGeom>
+          <a:noFill/>
+        </p:spPr>
+        <p:txBody>
+          <a:bodyPr wrap="square" lIns="0" tIns="0" rIns="0" bIns="0" rtlCol="0">
+            <a:spAutoFit/>
+          </a:bodyPr>
+          <a:lstStyle/>
+          <a:p>
+            <a:pPr marL="285750" indent="-285750" fontAlgn="base">
+              <a:spcBef>
+                <a:spcPct val="50000"/>
+              </a:spcBef>
+              <a:spcAft>
+                <a:spcPct val="0"/>
+              </a:spcAft>
+              <a:buClr>
+                <a:srgbClr val="F0AB00"/>
+              </a:buClr>
+              <a:buSzPct val="80000"/>
+              <a:buFont typeface="Arial" pitchFamily="34" charset="0"/>
+              <a:buChar char="•"/>
+            </a:pPr>
+            <a:r>
+              <a:rPr lang="en-US" kern="0" dirty="0" smtClean="0">
+                <a:ea typeface="Arial Unicode MS" pitchFamily="34" charset="-128"/>
+                <a:cs typeface="Arial Unicode MS" pitchFamily="34" charset="-128"/>
+              </a:rPr>
+              <a:t>Every exam can be linked with 0-many sections</a:t>
+            </a:r>
+          </a:p>
+          <a:p>
+            <a:pPr marL="285750" indent="-285750" fontAlgn="base">
+              <a:spcBef>
+                <a:spcPct val="50000"/>
+              </a:spcBef>
+              <a:spcAft>
+                <a:spcPct val="0"/>
+              </a:spcAft>
+              <a:buClr>
+                <a:srgbClr val="F0AB00"/>
+              </a:buClr>
+              <a:buSzPct val="80000"/>
+              <a:buFont typeface="Arial" pitchFamily="34" charset="0"/>
+              <a:buChar char="•"/>
+            </a:pPr>
+            <a:r>
+              <a:rPr lang="en-US" kern="0" dirty="0" smtClean="0">
+                <a:ea typeface="Arial Unicode MS" pitchFamily="34" charset="-128"/>
+                <a:cs typeface="Arial Unicode MS" pitchFamily="34" charset="-128"/>
+              </a:rPr>
+              <a:t>Each section can be linked with multiple questions</a:t>
+            </a:r>
+          </a:p>
+          <a:p>
+            <a:pPr marL="285750" indent="-285750" fontAlgn="base">
+              <a:spcBef>
+                <a:spcPct val="50000"/>
+              </a:spcBef>
+              <a:spcAft>
+                <a:spcPct val="0"/>
+              </a:spcAft>
+              <a:buClr>
+                <a:srgbClr val="F0AB00"/>
+              </a:buClr>
+              <a:buSzPct val="80000"/>
+              <a:buFont typeface="Arial" pitchFamily="34" charset="0"/>
+              <a:buChar char="•"/>
+            </a:pPr>
+            <a:r>
+              <a:rPr lang="en-US" dirty="0" smtClean="0"/>
+              <a:t>Each question associated to any given section will be associated with an answer</a:t>
+            </a:r>
+          </a:p>
+          <a:p>
+            <a:pPr marL="742950" lvl="1" indent="-285750" fontAlgn="base">
+              <a:spcBef>
+                <a:spcPct val="50000"/>
+              </a:spcBef>
+              <a:spcAft>
+                <a:spcPct val="0"/>
+              </a:spcAft>
+              <a:buClr>
+                <a:srgbClr val="F0AB00"/>
+              </a:buClr>
+              <a:buSzPct val="80000"/>
+              <a:buFont typeface="Arial" pitchFamily="34" charset="0"/>
+              <a:buChar char="•"/>
+            </a:pPr>
+            <a:r>
+              <a:rPr lang="en-US" dirty="0" smtClean="0"/>
+              <a:t>This means that the same question existing in 2 different section can have differing answers</a:t>
+            </a:r>
+            <a:r>
+              <a:rPr lang="en-US" dirty="0"/>
+              <a:t> </a:t>
+            </a:r>
+            <a:endParaRPr lang="en-US" kern="0" dirty="0" smtClean="0">
+              <a:ea typeface="Arial Unicode MS" pitchFamily="34" charset="-128"/>
+              <a:cs typeface="Arial Unicode MS" pitchFamily="34" charset="-128"/>
+            </a:endParaRPr>
+          </a:p>
+        </p:txBody>
+      </p:sp>
+      <p:pic>
+        <p:nvPicPr>
+          <p:cNvPr id="19" name="Picture 18"/>
+          <p:cNvPicPr>
+            <a:picLocks noChangeAspect="1"/>
+          </p:cNvPicPr>
+          <p:nvPr/>
+        </p:nvPicPr>
+        <p:blipFill>
+          <a:blip r:embed="rId3">
+            <a:extLst>
+              <a:ext uri="{28A0092B-C50C-407E-A947-70E740481C1C}">
+                <a14:useLocalDpi xmlns:a14="http://schemas.microsoft.com/office/drawing/2010/main" val="0"/>
+              </a:ext>
+            </a:extLst>
+          </a:blip>
+          <a:stretch>
+            <a:fillRect/>
+          </a:stretch>
+        </p:blipFill>
+        <p:spPr>
+          <a:xfrm>
+            <a:off x="367468" y="2418460"/>
+            <a:ext cx="3233919" cy="2615013"/>
+          </a:xfrm>
+          <a:prstGeom prst="rect">
+            <a:avLst/>
+          </a:prstGeom>
+        </p:spPr>
+      </p:pic>
+      <p:sp>
+        <p:nvSpPr>
+          <p:cNvPr id="20" name="TextBox 19"/>
+          <p:cNvSpPr txBox="1"/>
+          <p:nvPr/>
+        </p:nvSpPr>
+        <p:spPr>
+          <a:xfrm>
+            <a:off x="367468" y="5326949"/>
+            <a:ext cx="8152689" cy="1107996"/>
+          </a:xfrm>
+          <a:prstGeom prst="rect">
+            <a:avLst/>
+          </a:prstGeom>
+          <a:noFill/>
+        </p:spPr>
+        <p:txBody>
+          <a:bodyPr wrap="square" lIns="0" tIns="0" rIns="0" bIns="0" rtlCol="0">
+            <a:spAutoFit/>
+          </a:bodyPr>
+          <a:lstStyle/>
+          <a:p>
+            <a:pPr fontAlgn="base">
+              <a:spcBef>
+                <a:spcPct val="50000"/>
+              </a:spcBef>
+              <a:spcAft>
+                <a:spcPct val="0"/>
+              </a:spcAft>
+              <a:buClr>
+                <a:srgbClr val="F0AB00"/>
+              </a:buClr>
+              <a:buSzPct val="80000"/>
+            </a:pPr>
+            <a:r>
+              <a:rPr lang="en-US" sz="1800" kern="0" dirty="0" smtClean="0">
+                <a:ea typeface="Arial Unicode MS" pitchFamily="34" charset="-128"/>
+                <a:cs typeface="Arial Unicode MS" pitchFamily="34" charset="-128"/>
+              </a:rPr>
+              <a:t>Example:</a:t>
+            </a:r>
+          </a:p>
+          <a:p>
+            <a:pPr fontAlgn="base">
+              <a:spcBef>
+                <a:spcPct val="50000"/>
+              </a:spcBef>
+              <a:spcAft>
+                <a:spcPct val="0"/>
+              </a:spcAft>
+              <a:buClr>
+                <a:srgbClr val="F0AB00"/>
+              </a:buClr>
+              <a:buSzPct val="80000"/>
+            </a:pPr>
+            <a:r>
+              <a:rPr lang="en-US" kern="0" dirty="0" smtClean="0">
+                <a:ea typeface="Arial Unicode MS" pitchFamily="34" charset="-128"/>
+                <a:cs typeface="Arial Unicode MS" pitchFamily="34" charset="-128"/>
+              </a:rPr>
+              <a:t>Question: Is this absence of color black or white?</a:t>
+            </a:r>
+          </a:p>
+          <a:p>
+            <a:pPr fontAlgn="base">
+              <a:spcBef>
+                <a:spcPct val="50000"/>
+              </a:spcBef>
+              <a:spcAft>
+                <a:spcPct val="0"/>
+              </a:spcAft>
+              <a:buClr>
+                <a:srgbClr val="F0AB00"/>
+              </a:buClr>
+              <a:buSzPct val="80000"/>
+            </a:pPr>
+            <a:r>
+              <a:rPr lang="en-US" kern="0" dirty="0" smtClean="0">
+                <a:ea typeface="Arial Unicode MS" pitchFamily="34" charset="-128"/>
+                <a:cs typeface="Arial Unicode MS" pitchFamily="34" charset="-128"/>
+              </a:rPr>
+              <a:t>The answer would depend on the section; if physics, black, if art, white</a:t>
+            </a:r>
+            <a:endParaRPr lang="en-US" sz="1800" kern="0" dirty="0" smtClean="0">
+              <a:ea typeface="Arial Unicode MS" pitchFamily="34" charset="-128"/>
+              <a:cs typeface="Arial Unicode MS" pitchFamily="34" charset="-128"/>
+            </a:endParaRPr>
+          </a:p>
+        </p:txBody>
+      </p:sp>
+    </p:spTree>
+    <p:extLst>
+      <p:ext uri="{BB962C8B-B14F-4D97-AF65-F5344CB8AC3E}">
+        <p14:creationId xmlns:p14="http://schemas.microsoft.com/office/powerpoint/2010/main" val="3975852381"/>
+      </p:ext>
+    </p:extLst>
+  </p:cSld>
+  <p:clrMapOvr>
+    <a:masterClrMapping/>
+  </p:clrMapOvr>
+  <p:transition spd="med"/>
+  <p:timing>
+    <p:tnLst>
+      <p:par>
+        <p:cTn id="1" dur="indefinite" restart="never" nodeType="tmRoot"/>
+      </p:par>
+    </p:tnLst>
+  </p:timing>
+</p:sld>
+</file>
+
+<file path=ppt/slides/slide8.xml><?xml version="1.0" encoding="utf-8"?>
+<p:sld xmlns:a="http://schemas.openxmlformats.org/drawingml/2006/main" xmlns:r="http://schemas.openxmlformats.org/officeDocument/2006/relationships" xmlns:p="http://schemas.openxmlformats.org/presentationml/2006/main">
+  <p:cSld>
+    <p:spTree>
+      <p:nvGrpSpPr>
+        <p:cNvPr id="1" name=""/>
+        <p:cNvGrpSpPr/>
+        <p:nvPr/>
+      </p:nvGrpSpPr>
+      <p:grpSpPr>
+        <a:xfrm>
+          <a:off x="0" y="0"/>
+          <a:ext cx="0" cy="0"/>
+          <a:chOff x="0" y="0"/>
+          <a:chExt cx="0" cy="0"/>
+        </a:xfrm>
+      </p:grpSpPr>
+      <p:sp>
+        <p:nvSpPr>
           <p:cNvPr id="2" name="Title 1"/>
           <p:cNvSpPr>
             <a:spLocks noGrp="1"/>
@@ -8114,7 +8675,7 @@
 </p:sld>
 </file>
 
-<file path=ppt/slides/slide8.xml><?xml version="1.0" encoding="utf-8"?>
+<file path=ppt/slides/slide9.xml><?xml version="1.0" encoding="utf-8"?>
 <p:sld xmlns:a="http://schemas.openxmlformats.org/drawingml/2006/main" xmlns:r="http://schemas.openxmlformats.org/officeDocument/2006/relationships" xmlns:p="http://schemas.openxmlformats.org/presentationml/2006/main">
   <p:cSld>
     <p:spTree>
@@ -8208,165 +8769,6 @@
     <p:extLst>
       <p:ext uri="{BB962C8B-B14F-4D97-AF65-F5344CB8AC3E}">
         <p14:creationId xmlns:p14="http://schemas.microsoft.com/office/powerpoint/2010/main" val="2681646479"/>
-      </p:ext>
-    </p:extLst>
-  </p:cSld>
-  <p:clrMapOvr>
-    <a:masterClrMapping/>
-  </p:clrMapOvr>
-  <p:transition spd="med"/>
-  <p:timing>
-    <p:tnLst>
-      <p:par>
-        <p:cTn id="1" dur="indefinite" restart="never" nodeType="tmRoot"/>
-      </p:par>
-    </p:tnLst>
-  </p:timing>
-</p:sld>
-</file>
-
-<file path=ppt/slides/slide9.xml><?xml version="1.0" encoding="utf-8"?>
-<p:sld xmlns:a="http://schemas.openxmlformats.org/drawingml/2006/main" xmlns:r="http://schemas.openxmlformats.org/officeDocument/2006/relationships" xmlns:p="http://schemas.openxmlformats.org/presentationml/2006/main">
-  <p:cSld>
-    <p:spTree>
-      <p:nvGrpSpPr>
-        <p:cNvPr id="1" name=""/>
-        <p:cNvGrpSpPr/>
-        <p:nvPr/>
-      </p:nvGrpSpPr>
-      <p:grpSpPr>
-        <a:xfrm>
-          <a:off x="0" y="0"/>
-          <a:ext cx="0" cy="0"/>
-          <a:chOff x="0" y="0"/>
-          <a:chExt cx="0" cy="0"/>
-        </a:xfrm>
-      </p:grpSpPr>
-      <p:sp>
-        <p:nvSpPr>
-          <p:cNvPr id="2" name="Title 1"/>
-          <p:cNvSpPr>
-            <a:spLocks noGrp="1"/>
-          </p:cNvSpPr>
-          <p:nvPr>
-            <p:ph type="title"/>
-          </p:nvPr>
-        </p:nvSpPr>
-        <p:spPr/>
-        <p:txBody>
-          <a:bodyPr/>
-          <a:lstStyle/>
-          <a:p>
-            <a:r>
-              <a:rPr lang="en-US" dirty="0" smtClean="0"/>
-              <a:t>Why It’s Designed Like This</a:t>
-            </a:r>
-            <a:endParaRPr lang="en-US" sz="2000" b="0" dirty="0"/>
-          </a:p>
-        </p:txBody>
-      </p:sp>
-      <p:sp>
-        <p:nvSpPr>
-          <p:cNvPr id="3" name="Text Placeholder 2"/>
-          <p:cNvSpPr>
-            <a:spLocks noGrp="1"/>
-          </p:cNvSpPr>
-          <p:nvPr>
-            <p:ph type="body" sz="quarter" idx="10"/>
-          </p:nvPr>
-        </p:nvSpPr>
-        <p:spPr/>
-        <p:txBody>
-          <a:bodyPr/>
-          <a:lstStyle/>
-          <a:p>
-            <a:pPr lvl="0"/>
-            <a:r>
-              <a:rPr lang="en-US" dirty="0" smtClean="0"/>
-              <a:t>The database was designed like this to solve several use cases:</a:t>
-            </a:r>
-          </a:p>
-          <a:p>
-            <a:pPr marL="555625" lvl="2" indent="-285750">
-              <a:buFont typeface="Arial" pitchFamily="34" charset="0"/>
-              <a:buChar char="•"/>
-            </a:pPr>
-            <a:r>
-              <a:rPr lang="en-US" dirty="0" smtClean="0"/>
-              <a:t>An exam should be able to have multiple sections</a:t>
-            </a:r>
-          </a:p>
-          <a:p>
-            <a:pPr marL="555625" lvl="2" indent="-285750">
-              <a:buFont typeface="Arial" pitchFamily="34" charset="0"/>
-              <a:buChar char="•"/>
-            </a:pPr>
-            <a:r>
-              <a:rPr lang="en-US" dirty="0" smtClean="0"/>
-              <a:t>Each section should be able to have multiple questions</a:t>
-            </a:r>
-          </a:p>
-          <a:p>
-            <a:pPr marL="555625" lvl="2" indent="-285750">
-              <a:buFont typeface="Arial" pitchFamily="34" charset="0"/>
-              <a:buChar char="•"/>
-            </a:pPr>
-            <a:r>
-              <a:rPr lang="en-US" dirty="0" smtClean="0"/>
-              <a:t>Each question should be able to have several possible answers but only 1 correct one</a:t>
-            </a:r>
-          </a:p>
-          <a:p>
-            <a:pPr marL="555625" lvl="2" indent="-285750">
-              <a:buFont typeface="Arial" pitchFamily="34" charset="0"/>
-              <a:buChar char="•"/>
-            </a:pPr>
-            <a:r>
-              <a:rPr lang="en-US" dirty="0" smtClean="0"/>
-              <a:t>A question associated with any given section should not be required to have the same answer as itself in another section:</a:t>
-            </a:r>
-          </a:p>
-          <a:p>
-            <a:pPr marL="735750" lvl="3" indent="-285750">
-              <a:buFont typeface="Arial" pitchFamily="34" charset="0"/>
-              <a:buChar char="•"/>
-            </a:pPr>
-            <a:r>
-              <a:rPr lang="en-US" dirty="0" smtClean="0"/>
-              <a:t>ex:</a:t>
-            </a:r>
-          </a:p>
-          <a:p>
-            <a:pPr marL="915750" lvl="4" indent="-285750">
-              <a:buFont typeface="Arial" pitchFamily="34" charset="0"/>
-              <a:buChar char="•"/>
-            </a:pPr>
-            <a:r>
-              <a:rPr lang="en-US" dirty="0" smtClean="0"/>
-              <a:t>Question: What color do you get if you mix every color together?</a:t>
-            </a:r>
-          </a:p>
-          <a:p>
-            <a:pPr marL="915750" lvl="4" indent="-285750"/>
-            <a:r>
-              <a:rPr lang="en-US" dirty="0" smtClean="0"/>
-              <a:t>If this question was being asked in an “Art” section, the answer would be “Black”</a:t>
-            </a:r>
-          </a:p>
-          <a:p>
-            <a:pPr marL="915750" lvl="4" indent="-285750"/>
-            <a:r>
-              <a:rPr lang="en-US" dirty="0" smtClean="0"/>
-              <a:t>If this question was being asked in a “Physics” section, the answer would be “White”</a:t>
-            </a:r>
-            <a:endParaRPr lang="en-US" dirty="0"/>
-          </a:p>
-        </p:txBody>
-      </p:sp>
-    </p:spTree>
-    <p:extLst>
-      <p:ext uri="{BB962C8B-B14F-4D97-AF65-F5344CB8AC3E}">
-        <p14:creationId xmlns:p14="http://schemas.microsoft.com/office/powerpoint/2010/main" val="1492411916"/>
       </p:ext>
     </p:extLst>
   </p:cSld>

</xml_diff>